<commit_message>
Addition to introduction document
</commit_message>
<xml_diff>
--- a/Documents/introduction.pptx
+++ b/Documents/introduction.pptx
@@ -8,6 +8,8 @@
     <p:sldId id="256" r:id="rId2"/>
     <p:sldId id="257" r:id="rId3"/>
     <p:sldId id="259" r:id="rId4"/>
+    <p:sldId id="260" r:id="rId5"/>
+    <p:sldId id="261" r:id="rId6"/>
   </p:sldIdLst>
   <p:sldSz cx="12192000" cy="6858000"/>
   <p:notesSz cx="6858000" cy="9144000"/>
@@ -107,6 +109,23 @@
     </a:lvl9pPr>
   </p:defaultTextStyle>
   <p:extLst>
+    <p:ext uri="{521415D9-36F7-43E2-AB2F-B90AF26B5E84}">
+      <p14:sectionLst xmlns:p14="http://schemas.microsoft.com/office/powerpoint/2010/main">
+        <p14:section name="Default Section" id="{59D4A68D-B720-4F7B-9BB5-6D0A5DC01457}">
+          <p14:sldIdLst>
+            <p14:sldId id="256"/>
+            <p14:sldId id="257"/>
+            <p14:sldId id="259"/>
+          </p14:sldIdLst>
+        </p14:section>
+        <p14:section name="mercury network" id="{B71FD2B0-9343-490D-9910-35061F7DEECF}">
+          <p14:sldIdLst>
+            <p14:sldId id="260"/>
+            <p14:sldId id="261"/>
+          </p14:sldIdLst>
+        </p14:section>
+      </p14:sectionLst>
+    </p:ext>
     <p:ext uri="{EFAFB233-063F-42B5-8137-9DF3F51BA10A}">
       <p15:sldGuideLst xmlns:p15="http://schemas.microsoft.com/office/powerpoint/2012/main"/>
     </p:ext>
@@ -270,7 +289,7 @@
             <a:fld id="{5586B75A-687E-405C-8A0B-8D00578BA2C3}" type="datetimeFigureOut">
               <a:rPr lang="en-US" dirty="0"/>
               <a:pPr/>
-              <a:t>2/23/2013</a:t>
+              <a:t>2/24/2013</a:t>
             </a:fld>
             <a:endParaRPr lang="en-US" dirty="0"/>
           </a:p>
@@ -436,7 +455,7 @@
           <a:p>
             <a:fld id="{5F4E5243-F52A-4D37-9694-EB26C6C31910}" type="datetimeFigureOut">
               <a:rPr lang="en-US" dirty="0"/>
-              <a:t>2/23/2013</a:t>
+              <a:t>2/24/2013</a:t>
             </a:fld>
             <a:endParaRPr lang="en-US" dirty="0"/>
           </a:p>
@@ -611,7 +630,7 @@
           <a:p>
             <a:fld id="{3A77B6E1-634A-48DC-9E8B-D894023267EF}" type="datetimeFigureOut">
               <a:rPr lang="en-US" dirty="0"/>
-              <a:t>2/23/2013</a:t>
+              <a:t>2/24/2013</a:t>
             </a:fld>
             <a:endParaRPr lang="en-US" dirty="0"/>
           </a:p>
@@ -776,7 +795,7 @@
           <a:p>
             <a:fld id="{7B2D3E9E-A95C-48F2-B4BF-A71542E0BE9A}" type="datetimeFigureOut">
               <a:rPr lang="en-US" dirty="0"/>
-              <a:t>2/23/2013</a:t>
+              <a:t>2/24/2013</a:t>
             </a:fld>
             <a:endParaRPr lang="en-US" dirty="0"/>
           </a:p>
@@ -1036,7 +1055,7 @@
             <a:fld id="{5586B75A-687E-405C-8A0B-8D00578BA2C3}" type="datetimeFigureOut">
               <a:rPr lang="en-US" dirty="0"/>
               <a:pPr/>
-              <a:t>2/23/2013</a:t>
+              <a:t>2/24/2013</a:t>
             </a:fld>
             <a:endParaRPr lang="en-US" dirty="0"/>
           </a:p>
@@ -1320,7 +1339,7 @@
           <a:p>
             <a:fld id="{F12952B5-7A2F-4CC8-B7CE-9234E21C2837}" type="datetimeFigureOut">
               <a:rPr lang="en-US" dirty="0"/>
-              <a:t>2/23/2013</a:t>
+              <a:t>2/24/2013</a:t>
             </a:fld>
             <a:endParaRPr lang="en-US" dirty="0"/>
           </a:p>
@@ -1746,7 +1765,7 @@
           <a:p>
             <a:fld id="{CE1DA07A-9201-4B4B-BAF2-015AFA30F520}" type="datetimeFigureOut">
               <a:rPr lang="en-US" dirty="0"/>
-              <a:t>2/23/2013</a:t>
+              <a:t>2/24/2013</a:t>
             </a:fld>
             <a:endParaRPr lang="en-US" dirty="0"/>
           </a:p>
@@ -1859,7 +1878,7 @@
           <a:p>
             <a:fld id="{73D7E00A-486F-4252-8B1D-E32645521F49}" type="datetimeFigureOut">
               <a:rPr lang="en-US" dirty="0"/>
-              <a:t>2/23/2013</a:t>
+              <a:t>2/24/2013</a:t>
             </a:fld>
             <a:endParaRPr lang="en-US" dirty="0"/>
           </a:p>
@@ -1949,7 +1968,7 @@
           <a:p>
             <a:fld id="{8DDF5F92-E675-4B36-9A60-69A962A68675}" type="datetimeFigureOut">
               <a:rPr lang="en-US" dirty="0"/>
-              <a:t>2/23/2013</a:t>
+              <a:t>2/24/2013</a:t>
             </a:fld>
             <a:endParaRPr lang="en-US" dirty="0"/>
           </a:p>
@@ -2308,7 +2327,7 @@
           <a:p>
             <a:fld id="{AF6E2C9B-5FA2-460D-9BE7-B0812FC2A6FF}" type="datetimeFigureOut">
               <a:rPr lang="en-US" dirty="0"/>
-              <a:t>2/23/2013</a:t>
+              <a:t>2/24/2013</a:t>
             </a:fld>
             <a:endParaRPr lang="en-US" dirty="0"/>
           </a:p>
@@ -2605,7 +2624,7 @@
             <a:fld id="{5586B75A-687E-405C-8A0B-8D00578BA2C3}" type="datetimeFigureOut">
               <a:rPr lang="en-US" dirty="0"/>
               <a:pPr/>
-              <a:t>2/23/2013</a:t>
+              <a:t>2/24/2013</a:t>
             </a:fld>
             <a:endParaRPr lang="en-US" dirty="0"/>
           </a:p>
@@ -2815,7 +2834,7 @@
             <a:fld id="{5586B75A-687E-405C-8A0B-8D00578BA2C3}" type="datetimeFigureOut">
               <a:rPr lang="en-US" dirty="0"/>
               <a:pPr/>
-              <a:t>2/23/2013</a:t>
+              <a:t>2/24/2013</a:t>
             </a:fld>
             <a:endParaRPr lang="en-US" dirty="0"/>
           </a:p>
@@ -3282,26 +3301,19 @@
           <a:p>
             <a:r>
               <a:rPr lang="en-US" dirty="0" smtClean="0"/>
-              <a:t>a </a:t>
+              <a:t>task-based </a:t>
             </a:r>
             <a:r>
               <a:rPr lang="en-US" dirty="0" smtClean="0"/>
-              <a:t>task-based distributed computing framework</a:t>
-            </a:r>
-            <a:br>
+              <a:t>distributed </a:t>
+            </a:r>
+            <a:r>
               <a:rPr lang="en-US" dirty="0" smtClean="0"/>
-            </a:br>
+              <a:t>computing for </a:t>
+            </a:r>
             <a:r>
               <a:rPr lang="en-US" dirty="0" smtClean="0"/>
-              <a:t>for C</a:t>
-            </a:r>
-            <a:r>
-              <a:rPr lang="en-US" dirty="0" smtClean="0"/>
-              <a:t>#/.</a:t>
-            </a:r>
-            <a:r>
-              <a:rPr lang="en-US" dirty="0" smtClean="0"/>
-              <a:t>NET</a:t>
+              <a:t>C#/.NET</a:t>
             </a:r>
             <a:endParaRPr lang="en-US" dirty="0"/>
           </a:p>
@@ -3417,14 +3429,7 @@
                 <a:latin typeface="Courier New" panose="02070309020205020404" pitchFamily="49" charset="0"/>
                 <a:cs typeface="Courier New" panose="02070309020205020404" pitchFamily="49" charset="0"/>
               </a:rPr>
-              <a:t>&lt;T</a:t>
-            </a:r>
-            <a:r>
-              <a:rPr lang="en-US" dirty="0" smtClean="0">
-                <a:latin typeface="Courier New" panose="02070309020205020404" pitchFamily="49" charset="0"/>
-                <a:cs typeface="Courier New" panose="02070309020205020404" pitchFamily="49" charset="0"/>
-              </a:rPr>
-              <a:t>&gt;</a:t>
+              <a:t>&lt;T&gt;</a:t>
             </a:r>
           </a:p>
           <a:p>
@@ -3433,7 +3438,6 @@
               <a:rPr lang="en-US" dirty="0" smtClean="0"/>
               <a:t>pull one output</a:t>
             </a:r>
-            <a:endParaRPr lang="en-US" dirty="0" smtClean="0"/>
           </a:p>
           <a:p>
             <a:r>
@@ -3448,89 +3452,70 @@
                 <a:latin typeface="Courier New" panose="02070309020205020404" pitchFamily="49" charset="0"/>
                 <a:cs typeface="Courier New" panose="02070309020205020404" pitchFamily="49" charset="0"/>
               </a:rPr>
-              <a:t>&lt;T</a:t>
-            </a:r>
+              <a:t>&lt;T&gt;</a:t>
+            </a:r>
+          </a:p>
+          <a:p>
+            <a:pPr lvl="1"/>
+            <a:r>
+              <a:rPr lang="en-US" dirty="0" smtClean="0"/>
+              <a:t>pull many outputs</a:t>
+            </a:r>
+          </a:p>
+        </p:txBody>
+      </p:sp>
+      <p:sp>
+        <p:nvSpPr>
+          <p:cNvPr id="3" name="Text Placeholder 2"/>
+          <p:cNvSpPr>
+            <a:spLocks noGrp="1"/>
+          </p:cNvSpPr>
+          <p:nvPr>
+            <p:ph type="body" sz="quarter" idx="3"/>
+          </p:nvPr>
+        </p:nvSpPr>
+        <p:spPr/>
+        <p:txBody>
+          <a:bodyPr/>
+          <a:lstStyle/>
+          <a:p>
+            <a:r>
+              <a:rPr lang="en-US" cap="none" dirty="0" err="1" smtClean="0"/>
+              <a:t>async</a:t>
+            </a:r>
+            <a:endParaRPr lang="en-US" cap="none" dirty="0"/>
+          </a:p>
+        </p:txBody>
+      </p:sp>
+      <p:sp>
+        <p:nvSpPr>
+          <p:cNvPr id="9" name="Content Placeholder 8"/>
+          <p:cNvSpPr>
+            <a:spLocks noGrp="1"/>
+          </p:cNvSpPr>
+          <p:nvPr>
+            <p:ph sz="quarter" idx="4"/>
+          </p:nvPr>
+        </p:nvSpPr>
+        <p:spPr/>
+        <p:txBody>
+          <a:bodyPr/>
+          <a:lstStyle/>
+          <a:p>
             <a:r>
               <a:rPr lang="en-US" dirty="0" smtClean="0">
                 <a:latin typeface="Courier New" panose="02070309020205020404" pitchFamily="49" charset="0"/>
                 <a:cs typeface="Courier New" panose="02070309020205020404" pitchFamily="49" charset="0"/>
               </a:rPr>
-              <a:t>&gt;</a:t>
+              <a:t>Task&lt;T&gt;</a:t>
             </a:r>
           </a:p>
           <a:p>
             <a:pPr lvl="1"/>
             <a:r>
               <a:rPr lang="en-US" dirty="0" smtClean="0"/>
-              <a:t>pull many outputs</a:t>
-            </a:r>
-          </a:p>
-        </p:txBody>
-      </p:sp>
-      <p:sp>
-        <p:nvSpPr>
-          <p:cNvPr id="3" name="Text Placeholder 2"/>
-          <p:cNvSpPr>
-            <a:spLocks noGrp="1"/>
-          </p:cNvSpPr>
-          <p:nvPr>
-            <p:ph type="body" sz="quarter" idx="3"/>
-          </p:nvPr>
-        </p:nvSpPr>
-        <p:spPr/>
-        <p:txBody>
-          <a:bodyPr/>
-          <a:lstStyle/>
-          <a:p>
-            <a:r>
-              <a:rPr lang="en-US" cap="none" dirty="0" err="1" smtClean="0"/>
-              <a:t>async</a:t>
-            </a:r>
-            <a:endParaRPr lang="en-US" cap="none" dirty="0"/>
-          </a:p>
-        </p:txBody>
-      </p:sp>
-      <p:sp>
-        <p:nvSpPr>
-          <p:cNvPr id="9" name="Content Placeholder 8"/>
-          <p:cNvSpPr>
-            <a:spLocks noGrp="1"/>
-          </p:cNvSpPr>
-          <p:nvPr>
-            <p:ph sz="quarter" idx="4"/>
-          </p:nvPr>
-        </p:nvSpPr>
-        <p:spPr/>
-        <p:txBody>
-          <a:bodyPr/>
-          <a:lstStyle/>
-          <a:p>
-            <a:r>
-              <a:rPr lang="en-US" dirty="0" smtClean="0">
-                <a:latin typeface="Courier New" panose="02070309020205020404" pitchFamily="49" charset="0"/>
-                <a:cs typeface="Courier New" panose="02070309020205020404" pitchFamily="49" charset="0"/>
-              </a:rPr>
-              <a:t>Task&lt;T</a:t>
-            </a:r>
-            <a:r>
-              <a:rPr lang="en-US" dirty="0" smtClean="0">
-                <a:latin typeface="Courier New" panose="02070309020205020404" pitchFamily="49" charset="0"/>
-                <a:cs typeface="Courier New" panose="02070309020205020404" pitchFamily="49" charset="0"/>
-              </a:rPr>
-              <a:t>&gt;</a:t>
-            </a:r>
-          </a:p>
-          <a:p>
-            <a:pPr lvl="1"/>
-            <a:r>
-              <a:rPr lang="en-US" dirty="0" smtClean="0"/>
-              <a:t>o</a:t>
-            </a:r>
-            <a:r>
-              <a:rPr lang="en-US" dirty="0" smtClean="0"/>
-              <a:t>ne output pushed back</a:t>
-            </a:r>
-            <a:endParaRPr lang="en-US" dirty="0" smtClean="0"/>
+              <a:t>one output pushed back</a:t>
+            </a:r>
           </a:p>
           <a:p>
             <a:r>
@@ -3545,14 +3530,7 @@
                 <a:latin typeface="Courier New" panose="02070309020205020404" pitchFamily="49" charset="0"/>
                 <a:cs typeface="Courier New" panose="02070309020205020404" pitchFamily="49" charset="0"/>
               </a:rPr>
-              <a:t>&lt;T</a:t>
-            </a:r>
-            <a:r>
-              <a:rPr lang="en-US" dirty="0" smtClean="0">
-                <a:latin typeface="Courier New" panose="02070309020205020404" pitchFamily="49" charset="0"/>
-                <a:cs typeface="Courier New" panose="02070309020205020404" pitchFamily="49" charset="0"/>
-              </a:rPr>
-              <a:t>&gt;</a:t>
+              <a:t>&lt;T&gt;</a:t>
             </a:r>
           </a:p>
           <a:p>
@@ -3575,11 +3553,11 @@
   <p:clrMapOvr>
     <a:masterClrMapping/>
   </p:clrMapOvr>
-  <mc:AlternateContent xmlns:mc="http://schemas.openxmlformats.org/markup-compatibility/2006">
-    <mc:Choice xmlns:p14="http://schemas.microsoft.com/office/powerpoint/2010/main" Requires="p14">
+  <mc:AlternateContent xmlns:mc="http://schemas.openxmlformats.org/markup-compatibility/2006" xmlns:p14="http://schemas.microsoft.com/office/powerpoint/2010/main">
+    <mc:Choice Requires="p14">
       <p:transition spd="slow" p14:dur="2000"/>
     </mc:Choice>
-    <mc:Fallback>
+    <mc:Fallback xmlns="">
       <p:transition spd="slow"/>
     </mc:Fallback>
   </mc:AlternateContent>
@@ -3745,6 +3723,363 @@
       </p:par>
     </p:tnLst>
   </p:timing>
+</p:sld>
+</file>
+
+<file path=ppt/slides/slide4.xml><?xml version="1.0" encoding="utf-8"?>
+<p:sld xmlns:a="http://schemas.openxmlformats.org/drawingml/2006/main" xmlns:r="http://schemas.openxmlformats.org/officeDocument/2006/relationships" xmlns:p="http://schemas.openxmlformats.org/presentationml/2006/main">
+  <p:cSld>
+    <p:spTree>
+      <p:nvGrpSpPr>
+        <p:cNvPr id="1" name=""/>
+        <p:cNvGrpSpPr/>
+        <p:nvPr/>
+      </p:nvGrpSpPr>
+      <p:grpSpPr>
+        <a:xfrm>
+          <a:off x="0" y="0"/>
+          <a:ext cx="0" cy="0"/>
+          <a:chOff x="0" y="0"/>
+          <a:chExt cx="0" cy="0"/>
+        </a:xfrm>
+      </p:grpSpPr>
+      <p:sp>
+        <p:nvSpPr>
+          <p:cNvPr id="5" name="Title 4"/>
+          <p:cNvSpPr>
+            <a:spLocks noGrp="1"/>
+          </p:cNvSpPr>
+          <p:nvPr>
+            <p:ph type="title"/>
+          </p:nvPr>
+        </p:nvSpPr>
+        <p:spPr/>
+        <p:txBody>
+          <a:bodyPr/>
+          <a:lstStyle/>
+          <a:p>
+            <a:r>
+              <a:rPr lang="en-US" dirty="0" smtClean="0"/>
+              <a:t>code-mercury . network</a:t>
+            </a:r>
+            <a:endParaRPr lang="en-US" dirty="0"/>
+          </a:p>
+        </p:txBody>
+      </p:sp>
+      <p:sp>
+        <p:nvSpPr>
+          <p:cNvPr id="6" name="Text Placeholder 5"/>
+          <p:cNvSpPr>
+            <a:spLocks noGrp="1"/>
+          </p:cNvSpPr>
+          <p:nvPr>
+            <p:ph type="body" idx="1"/>
+          </p:nvPr>
+        </p:nvSpPr>
+        <p:spPr/>
+        <p:txBody>
+          <a:bodyPr/>
+          <a:lstStyle/>
+          <a:p>
+            <a:r>
+              <a:rPr lang="en-US" dirty="0" smtClean="0"/>
+              <a:t>how messages are sent</a:t>
+            </a:r>
+            <a:endParaRPr lang="en-US" dirty="0"/>
+          </a:p>
+        </p:txBody>
+      </p:sp>
+    </p:spTree>
+    <p:extLst>
+      <p:ext uri="{BB962C8B-B14F-4D97-AF65-F5344CB8AC3E}">
+        <p14:creationId xmlns:p14="http://schemas.microsoft.com/office/powerpoint/2010/main" val="771555043"/>
+      </p:ext>
+    </p:extLst>
+  </p:cSld>
+  <p:clrMapOvr>
+    <a:masterClrMapping/>
+  </p:clrMapOvr>
+</p:sld>
+</file>
+
+<file path=ppt/slides/slide5.xml><?xml version="1.0" encoding="utf-8"?>
+<p:sld xmlns:a="http://schemas.openxmlformats.org/drawingml/2006/main" xmlns:r="http://schemas.openxmlformats.org/officeDocument/2006/relationships" xmlns:p="http://schemas.openxmlformats.org/presentationml/2006/main">
+  <p:cSld>
+    <p:spTree>
+      <p:nvGrpSpPr>
+        <p:cNvPr id="1" name=""/>
+        <p:cNvGrpSpPr/>
+        <p:nvPr/>
+      </p:nvGrpSpPr>
+      <p:grpSpPr>
+        <a:xfrm>
+          <a:off x="0" y="0"/>
+          <a:ext cx="0" cy="0"/>
+          <a:chOff x="0" y="0"/>
+          <a:chExt cx="0" cy="0"/>
+        </a:xfrm>
+      </p:grpSpPr>
+      <p:sp>
+        <p:nvSpPr>
+          <p:cNvPr id="4" name="Title 3"/>
+          <p:cNvSpPr>
+            <a:spLocks noGrp="1"/>
+          </p:cNvSpPr>
+          <p:nvPr>
+            <p:ph type="title"/>
+          </p:nvPr>
+        </p:nvSpPr>
+        <p:spPr/>
+        <p:txBody>
+          <a:bodyPr/>
+          <a:lstStyle/>
+          <a:p>
+            <a:r>
+              <a:rPr lang="en-US" dirty="0" smtClean="0"/>
+              <a:t>mercury node</a:t>
+            </a:r>
+            <a:endParaRPr lang="en-US" dirty="0"/>
+          </a:p>
+        </p:txBody>
+      </p:sp>
+      <mc:AlternateContent xmlns:mc="http://schemas.openxmlformats.org/markup-compatibility/2006">
+        <mc:Choice xmlns:a14="http://schemas.microsoft.com/office/drawing/2010/main" Requires="a14">
+          <p:sp>
+            <p:nvSpPr>
+              <p:cNvPr id="5" name="Content Placeholder 4"/>
+              <p:cNvSpPr>
+                <a:spLocks noGrp="1"/>
+              </p:cNvSpPr>
+              <p:nvPr>
+                <p:ph idx="1"/>
+              </p:nvPr>
+            </p:nvSpPr>
+            <p:spPr/>
+            <p:txBody>
+              <a:bodyPr>
+                <a:normAutofit lnSpcReduction="10000"/>
+              </a:bodyPr>
+              <a:lstStyle/>
+              <a:p>
+                <a:r>
+                  <a:rPr lang="en-US" dirty="0" smtClean="0"/>
+                  <a:t>has a binary string identity</a:t>
+                </a:r>
+              </a:p>
+              <a:p>
+                <a:pPr lvl="1"/>
+                <a:r>
+                  <a:rPr lang="en-US" dirty="0" smtClean="0"/>
+                  <a:t>for example, 01101</a:t>
+                </a:r>
+              </a:p>
+              <a:p>
+                <a:r>
+                  <a:rPr lang="en-US" dirty="0" smtClean="0"/>
+                  <a:t>has a TCP address</a:t>
+                </a:r>
+              </a:p>
+              <a:p>
+                <a:pPr lvl="1"/>
+                <a:r>
+                  <a:rPr lang="en-US" dirty="0" smtClean="0"/>
+                  <a:t>for example tcp://11.22.33.44:5555</a:t>
+                </a:r>
+              </a:p>
+              <a:p>
+                <a:r>
+                  <a:rPr lang="en-US" dirty="0" smtClean="0"/>
+                  <a:t>has neighbor mercury nodes</a:t>
+                </a:r>
+              </a:p>
+              <a:p>
+                <a:pPr lvl="1"/>
+                <a:r>
+                  <a:rPr lang="en-US" dirty="0" smtClean="0"/>
+                  <a:t>for example, 01101 has neighbors </a:t>
+                </a:r>
+                <a:r>
+                  <a:rPr lang="en-US" dirty="0" smtClean="0">
+                    <a:solidFill>
+                      <a:srgbClr val="FF0000"/>
+                    </a:solidFill>
+                  </a:rPr>
+                  <a:t>1</a:t>
+                </a:r>
+                <a:r>
+                  <a:rPr lang="en-US" dirty="0" smtClean="0"/>
+                  <a:t>1101, 0</a:t>
+                </a:r>
+                <a:r>
+                  <a:rPr lang="en-US" dirty="0" smtClean="0">
+                    <a:solidFill>
+                      <a:srgbClr val="FF0000"/>
+                    </a:solidFill>
+                  </a:rPr>
+                  <a:t>0</a:t>
+                </a:r>
+                <a:r>
+                  <a:rPr lang="en-US" dirty="0" smtClean="0"/>
+                  <a:t>101, 01</a:t>
+                </a:r>
+                <a:r>
+                  <a:rPr lang="en-US" dirty="0" smtClean="0">
+                    <a:solidFill>
+                      <a:srgbClr val="FF0000"/>
+                    </a:solidFill>
+                  </a:rPr>
+                  <a:t>0</a:t>
+                </a:r>
+                <a:r>
+                  <a:rPr lang="en-US" dirty="0" smtClean="0"/>
+                  <a:t>01, 011</a:t>
+                </a:r>
+                <a:r>
+                  <a:rPr lang="en-US" dirty="0" smtClean="0">
+                    <a:solidFill>
+                      <a:srgbClr val="FF0000"/>
+                    </a:solidFill>
+                  </a:rPr>
+                  <a:t>1</a:t>
+                </a:r>
+                <a:r>
+                  <a:rPr lang="en-US" dirty="0" smtClean="0"/>
+                  <a:t>1, 0111</a:t>
+                </a:r>
+                <a:r>
+                  <a:rPr lang="en-US" dirty="0" smtClean="0">
+                    <a:solidFill>
+                      <a:srgbClr val="FF0000"/>
+                    </a:solidFill>
+                  </a:rPr>
+                  <a:t>0</a:t>
+                </a:r>
+              </a:p>
+              <a:p>
+                <a:endParaRPr lang="en-US" dirty="0" smtClean="0">
+                  <a:solidFill>
+                    <a:srgbClr val="FF0000"/>
+                  </a:solidFill>
+                </a:endParaRPr>
+              </a:p>
+              <a:p>
+                <a:r>
+                  <a:rPr lang="en-US" dirty="0" smtClean="0"/>
+                  <a:t>(for math people: it’s a graph with vertices in </a:t>
+                </a:r>
+                <a14:m>
+                  <m:oMath xmlns:m="http://schemas.openxmlformats.org/officeDocument/2006/math">
+                    <m:sSup>
+                      <m:sSupPr>
+                        <m:ctrlPr>
+                          <a:rPr lang="en-US" b="0" i="1" smtClean="0">
+                            <a:latin typeface="Cambria Math" panose="02040503050406030204" pitchFamily="18" charset="0"/>
+                          </a:rPr>
+                        </m:ctrlPr>
+                      </m:sSupPr>
+                      <m:e>
+                        <m:d>
+                          <m:dPr>
+                            <m:begChr m:val="{"/>
+                            <m:endChr m:val="}"/>
+                            <m:ctrlPr>
+                              <a:rPr lang="en-US" b="0" i="1" smtClean="0">
+                                <a:latin typeface="Cambria Math" panose="02040503050406030204" pitchFamily="18" charset="0"/>
+                              </a:rPr>
+                            </m:ctrlPr>
+                          </m:dPr>
+                          <m:e>
+                            <m:r>
+                              <a:rPr lang="en-US" b="0" i="1" smtClean="0">
+                                <a:latin typeface="Cambria Math" panose="02040503050406030204" pitchFamily="18" charset="0"/>
+                              </a:rPr>
+                              <m:t>0,1</m:t>
+                            </m:r>
+                          </m:e>
+                        </m:d>
+                      </m:e>
+                      <m:sup>
+                        <m:r>
+                          <a:rPr lang="en-US" b="0" i="1" smtClean="0">
+                            <a:latin typeface="Cambria Math" panose="02040503050406030204" pitchFamily="18" charset="0"/>
+                          </a:rPr>
+                          <m:t>𝑛</m:t>
+                        </m:r>
+                      </m:sup>
+                    </m:sSup>
+                  </m:oMath>
+                </a14:m>
+                <a:r>
+                  <a:rPr lang="en-US" dirty="0" smtClean="0"/>
+                  <a:t> where edges go between vertices that have a Hamming distance of </a:t>
+                </a:r>
+                <a14:m>
+                  <m:oMath xmlns:m="http://schemas.openxmlformats.org/officeDocument/2006/math">
+                    <m:r>
+                      <a:rPr lang="en-US" b="0" i="1" smtClean="0">
+                        <a:latin typeface="Cambria Math" panose="02040503050406030204" pitchFamily="18" charset="0"/>
+                      </a:rPr>
+                      <m:t>1</m:t>
+                    </m:r>
+                  </m:oMath>
+                </a14:m>
+                <a:r>
+                  <a:rPr lang="en-US" dirty="0" smtClean="0"/>
+                  <a:t> between them)</a:t>
+                </a:r>
+                <a:endParaRPr lang="en-US" dirty="0">
+                  <a:solidFill>
+                    <a:srgbClr val="FF0000"/>
+                  </a:solidFill>
+                </a:endParaRPr>
+              </a:p>
+            </p:txBody>
+          </p:sp>
+        </mc:Choice>
+        <mc:Fallback>
+          <p:sp>
+            <p:nvSpPr>
+              <p:cNvPr id="5" name="Content Placeholder 4"/>
+              <p:cNvSpPr>
+                <a:spLocks noGrp="1" noRot="1" noChangeAspect="1" noMove="1" noResize="1" noEditPoints="1" noAdjustHandles="1" noChangeArrowheads="1" noChangeShapeType="1" noTextEdit="1"/>
+              </p:cNvSpPr>
+              <p:nvPr>
+                <p:ph idx="1"/>
+              </p:nvPr>
+            </p:nvSpPr>
+            <p:spPr>
+              <a:blipFill rotWithShape="0">
+                <a:blip r:embed="rId2"/>
+                <a:stretch>
+                  <a:fillRect t="-3398"/>
+                </a:stretch>
+              </a:blipFill>
+            </p:spPr>
+            <p:txBody>
+              <a:bodyPr/>
+              <a:lstStyle/>
+              <a:p>
+                <a:r>
+                  <a:rPr lang="en-US">
+                    <a:noFill/>
+                  </a:rPr>
+                  <a:t> </a:t>
+                </a:r>
+              </a:p>
+            </p:txBody>
+          </p:sp>
+        </mc:Fallback>
+      </mc:AlternateContent>
+    </p:spTree>
+    <p:extLst>
+      <p:ext uri="{BB962C8B-B14F-4D97-AF65-F5344CB8AC3E}">
+        <p14:creationId xmlns:p14="http://schemas.microsoft.com/office/powerpoint/2010/main" val="2401987409"/>
+      </p:ext>
+    </p:extLst>
+  </p:cSld>
+  <p:clrMapOvr>
+    <a:masterClrMapping/>
+  </p:clrMapOvr>
 </p:sld>
 </file>
 

</xml_diff>